<commit_message>
Minor change to progress update slides.
</commit_message>
<xml_diff>
--- a/Course_Avail_Progress.pptx
+++ b/Course_Avail_Progress.pptx
@@ -6,6 +6,9 @@
     <p:sldMasterId id="2147483673" r:id="rId2"/>
     <p:sldMasterId id="2147483685" r:id="rId3"/>
   </p:sldMasterIdLst>
+  <p:notesMasterIdLst>
+    <p:notesMasterId r:id="rId13"/>
+  </p:notesMasterIdLst>
   <p:sldIdLst>
     <p:sldId id="258" r:id="rId4"/>
     <p:sldId id="265" r:id="rId5"/>
@@ -114,7 +117,465 @@
       </a:defRPr>
     </a:lvl9pPr>
   </p:defaultTextStyle>
+  <p:extLst>
+    <p:ext uri="{EFAFB233-063F-42B5-8137-9DF3F51BA10A}">
+      <p15:sldGuideLst xmlns:p15="http://schemas.microsoft.com/office/powerpoint/2012/main">
+        <p15:guide id="1" orient="horz" pos="1620">
+          <p15:clr>
+            <a:srgbClr val="A4A3A4"/>
+          </p15:clr>
+        </p15:guide>
+        <p15:guide id="2" pos="2880">
+          <p15:clr>
+            <a:srgbClr val="A4A3A4"/>
+          </p15:clr>
+        </p15:guide>
+      </p15:sldGuideLst>
+    </p:ext>
+  </p:extLst>
 </p:presentation>
+</file>
+
+<file path=ppt/notesMasters/notesMaster1.xml><?xml version="1.0" encoding="utf-8"?>
+<p:notesMaster xmlns:a="http://schemas.openxmlformats.org/drawingml/2006/main" xmlns:r="http://schemas.openxmlformats.org/officeDocument/2006/relationships" xmlns:p="http://schemas.openxmlformats.org/presentationml/2006/main">
+  <p:cSld>
+    <p:bg>
+      <p:bgRef idx="1001">
+        <a:schemeClr val="bg1"/>
+      </p:bgRef>
+    </p:bg>
+    <p:spTree>
+      <p:nvGrpSpPr>
+        <p:cNvPr id="1" name=""/>
+        <p:cNvGrpSpPr/>
+        <p:nvPr/>
+      </p:nvGrpSpPr>
+      <p:grpSpPr>
+        <a:xfrm>
+          <a:off x="0" y="0"/>
+          <a:ext cx="0" cy="0"/>
+          <a:chOff x="0" y="0"/>
+          <a:chExt cx="0" cy="0"/>
+        </a:xfrm>
+      </p:grpSpPr>
+      <p:sp>
+        <p:nvSpPr>
+          <p:cNvPr id="2" name="Header Placeholder 1"/>
+          <p:cNvSpPr>
+            <a:spLocks noGrp="1"/>
+          </p:cNvSpPr>
+          <p:nvPr>
+            <p:ph type="hdr" sz="quarter"/>
+          </p:nvPr>
+        </p:nvSpPr>
+        <p:spPr>
+          <a:xfrm>
+            <a:off x="0" y="0"/>
+            <a:ext cx="2971800" cy="458788"/>
+          </a:xfrm>
+          <a:prstGeom prst="rect">
+            <a:avLst/>
+          </a:prstGeom>
+        </p:spPr>
+        <p:txBody>
+          <a:bodyPr vert="horz" lIns="91440" tIns="45720" rIns="91440" bIns="45720" rtlCol="0"/>
+          <a:lstStyle>
+            <a:lvl1pPr algn="l">
+              <a:defRPr sz="1200"/>
+            </a:lvl1pPr>
+          </a:lstStyle>
+          <a:p>
+            <a:endParaRPr lang="en-US"/>
+          </a:p>
+        </p:txBody>
+      </p:sp>
+      <p:sp>
+        <p:nvSpPr>
+          <p:cNvPr id="3" name="Date Placeholder 2"/>
+          <p:cNvSpPr>
+            <a:spLocks noGrp="1"/>
+          </p:cNvSpPr>
+          <p:nvPr>
+            <p:ph type="dt" idx="1"/>
+          </p:nvPr>
+        </p:nvSpPr>
+        <p:spPr>
+          <a:xfrm>
+            <a:off x="3884613" y="0"/>
+            <a:ext cx="2971800" cy="458788"/>
+          </a:xfrm>
+          <a:prstGeom prst="rect">
+            <a:avLst/>
+          </a:prstGeom>
+        </p:spPr>
+        <p:txBody>
+          <a:bodyPr vert="horz" lIns="91440" tIns="45720" rIns="91440" bIns="45720" rtlCol="0"/>
+          <a:lstStyle>
+            <a:lvl1pPr algn="r">
+              <a:defRPr sz="1200"/>
+            </a:lvl1pPr>
+          </a:lstStyle>
+          <a:p>
+            <a:fld id="{A37281A0-962A-47F4-9481-A75AEA6E69B5}" type="datetimeFigureOut">
+              <a:rPr lang="en-US" smtClean="0"/>
+              <a:t>10/29/2013</a:t>
+            </a:fld>
+            <a:endParaRPr lang="en-US"/>
+          </a:p>
+        </p:txBody>
+      </p:sp>
+      <p:sp>
+        <p:nvSpPr>
+          <p:cNvPr id="4" name="Slide Image Placeholder 3"/>
+          <p:cNvSpPr>
+            <a:spLocks noGrp="1" noRot="1" noChangeAspect="1"/>
+          </p:cNvSpPr>
+          <p:nvPr>
+            <p:ph type="sldImg" idx="2"/>
+          </p:nvPr>
+        </p:nvSpPr>
+        <p:spPr>
+          <a:xfrm>
+            <a:off x="685800" y="1143000"/>
+            <a:ext cx="5486400" cy="3086100"/>
+          </a:xfrm>
+          <a:prstGeom prst="rect">
+            <a:avLst/>
+          </a:prstGeom>
+          <a:noFill/>
+          <a:ln w="12700">
+            <a:solidFill>
+              <a:prstClr val="black"/>
+            </a:solidFill>
+          </a:ln>
+        </p:spPr>
+        <p:txBody>
+          <a:bodyPr vert="horz" lIns="91440" tIns="45720" rIns="91440" bIns="45720" rtlCol="0" anchor="ctr"/>
+          <a:lstStyle/>
+          <a:p>
+            <a:endParaRPr lang="en-US"/>
+          </a:p>
+        </p:txBody>
+      </p:sp>
+      <p:sp>
+        <p:nvSpPr>
+          <p:cNvPr id="5" name="Notes Placeholder 4"/>
+          <p:cNvSpPr>
+            <a:spLocks noGrp="1"/>
+          </p:cNvSpPr>
+          <p:nvPr>
+            <p:ph type="body" sz="quarter" idx="3"/>
+          </p:nvPr>
+        </p:nvSpPr>
+        <p:spPr>
+          <a:xfrm>
+            <a:off x="685800" y="4400550"/>
+            <a:ext cx="5486400" cy="3600450"/>
+          </a:xfrm>
+          <a:prstGeom prst="rect">
+            <a:avLst/>
+          </a:prstGeom>
+        </p:spPr>
+        <p:txBody>
+          <a:bodyPr vert="horz" lIns="91440" tIns="45720" rIns="91440" bIns="45720" rtlCol="0"/>
+          <a:lstStyle/>
+          <a:p>
+            <a:pPr lvl="0"/>
+            <a:r>
+              <a:rPr lang="en-US" smtClean="0"/>
+              <a:t>Click to edit Master text styles</a:t>
+            </a:r>
+          </a:p>
+          <a:p>
+            <a:pPr lvl="1"/>
+            <a:r>
+              <a:rPr lang="en-US" smtClean="0"/>
+              <a:t>Second level</a:t>
+            </a:r>
+          </a:p>
+          <a:p>
+            <a:pPr lvl="2"/>
+            <a:r>
+              <a:rPr lang="en-US" smtClean="0"/>
+              <a:t>Third level</a:t>
+            </a:r>
+          </a:p>
+          <a:p>
+            <a:pPr lvl="3"/>
+            <a:r>
+              <a:rPr lang="en-US" smtClean="0"/>
+              <a:t>Fourth level</a:t>
+            </a:r>
+          </a:p>
+          <a:p>
+            <a:pPr lvl="4"/>
+            <a:r>
+              <a:rPr lang="en-US" smtClean="0"/>
+              <a:t>Fifth level</a:t>
+            </a:r>
+            <a:endParaRPr lang="en-US"/>
+          </a:p>
+        </p:txBody>
+      </p:sp>
+      <p:sp>
+        <p:nvSpPr>
+          <p:cNvPr id="6" name="Footer Placeholder 5"/>
+          <p:cNvSpPr>
+            <a:spLocks noGrp="1"/>
+          </p:cNvSpPr>
+          <p:nvPr>
+            <p:ph type="ftr" sz="quarter" idx="4"/>
+          </p:nvPr>
+        </p:nvSpPr>
+        <p:spPr>
+          <a:xfrm>
+            <a:off x="0" y="8685213"/>
+            <a:ext cx="2971800" cy="458787"/>
+          </a:xfrm>
+          <a:prstGeom prst="rect">
+            <a:avLst/>
+          </a:prstGeom>
+        </p:spPr>
+        <p:txBody>
+          <a:bodyPr vert="horz" lIns="91440" tIns="45720" rIns="91440" bIns="45720" rtlCol="0" anchor="b"/>
+          <a:lstStyle>
+            <a:lvl1pPr algn="l">
+              <a:defRPr sz="1200"/>
+            </a:lvl1pPr>
+          </a:lstStyle>
+          <a:p>
+            <a:endParaRPr lang="en-US"/>
+          </a:p>
+        </p:txBody>
+      </p:sp>
+      <p:sp>
+        <p:nvSpPr>
+          <p:cNvPr id="7" name="Slide Number Placeholder 6"/>
+          <p:cNvSpPr>
+            <a:spLocks noGrp="1"/>
+          </p:cNvSpPr>
+          <p:nvPr>
+            <p:ph type="sldNum" sz="quarter" idx="5"/>
+          </p:nvPr>
+        </p:nvSpPr>
+        <p:spPr>
+          <a:xfrm>
+            <a:off x="3884613" y="8685213"/>
+            <a:ext cx="2971800" cy="458787"/>
+          </a:xfrm>
+          <a:prstGeom prst="rect">
+            <a:avLst/>
+          </a:prstGeom>
+        </p:spPr>
+        <p:txBody>
+          <a:bodyPr vert="horz" lIns="91440" tIns="45720" rIns="91440" bIns="45720" rtlCol="0" anchor="b"/>
+          <a:lstStyle>
+            <a:lvl1pPr algn="r">
+              <a:defRPr sz="1200"/>
+            </a:lvl1pPr>
+          </a:lstStyle>
+          <a:p>
+            <a:fld id="{3485A29B-357A-4063-A4EA-E6DDBC92BB77}" type="slidenum">
+              <a:rPr lang="en-US" smtClean="0"/>
+              <a:t>‹#›</a:t>
+            </a:fld>
+            <a:endParaRPr lang="en-US"/>
+          </a:p>
+        </p:txBody>
+      </p:sp>
+    </p:spTree>
+    <p:extLst>
+      <p:ext uri="{BB962C8B-B14F-4D97-AF65-F5344CB8AC3E}">
+        <p14:creationId xmlns:p14="http://schemas.microsoft.com/office/powerpoint/2010/main" val="482003196"/>
+      </p:ext>
+    </p:extLst>
+  </p:cSld>
+  <p:clrMap bg1="lt1" tx1="dk1" bg2="lt2" tx2="dk2" accent1="accent1" accent2="accent2" accent3="accent3" accent4="accent4" accent5="accent5" accent6="accent6" hlink="hlink" folHlink="folHlink"/>
+  <p:notesStyle>
+    <a:lvl1pPr marL="0" algn="l" defTabSz="914400" rtl="0" eaLnBrk="1" latinLnBrk="0" hangingPunct="1">
+      <a:defRPr sz="1200" kern="1200">
+        <a:solidFill>
+          <a:schemeClr val="tx1"/>
+        </a:solidFill>
+        <a:latin typeface="+mn-lt"/>
+        <a:ea typeface="+mn-ea"/>
+        <a:cs typeface="+mn-cs"/>
+      </a:defRPr>
+    </a:lvl1pPr>
+    <a:lvl2pPr marL="457200" algn="l" defTabSz="914400" rtl="0" eaLnBrk="1" latinLnBrk="0" hangingPunct="1">
+      <a:defRPr sz="1200" kern="1200">
+        <a:solidFill>
+          <a:schemeClr val="tx1"/>
+        </a:solidFill>
+        <a:latin typeface="+mn-lt"/>
+        <a:ea typeface="+mn-ea"/>
+        <a:cs typeface="+mn-cs"/>
+      </a:defRPr>
+    </a:lvl2pPr>
+    <a:lvl3pPr marL="914400" algn="l" defTabSz="914400" rtl="0" eaLnBrk="1" latinLnBrk="0" hangingPunct="1">
+      <a:defRPr sz="1200" kern="1200">
+        <a:solidFill>
+          <a:schemeClr val="tx1"/>
+        </a:solidFill>
+        <a:latin typeface="+mn-lt"/>
+        <a:ea typeface="+mn-ea"/>
+        <a:cs typeface="+mn-cs"/>
+      </a:defRPr>
+    </a:lvl3pPr>
+    <a:lvl4pPr marL="1371600" algn="l" defTabSz="914400" rtl="0" eaLnBrk="1" latinLnBrk="0" hangingPunct="1">
+      <a:defRPr sz="1200" kern="1200">
+        <a:solidFill>
+          <a:schemeClr val="tx1"/>
+        </a:solidFill>
+        <a:latin typeface="+mn-lt"/>
+        <a:ea typeface="+mn-ea"/>
+        <a:cs typeface="+mn-cs"/>
+      </a:defRPr>
+    </a:lvl4pPr>
+    <a:lvl5pPr marL="1828800" algn="l" defTabSz="914400" rtl="0" eaLnBrk="1" latinLnBrk="0" hangingPunct="1">
+      <a:defRPr sz="1200" kern="1200">
+        <a:solidFill>
+          <a:schemeClr val="tx1"/>
+        </a:solidFill>
+        <a:latin typeface="+mn-lt"/>
+        <a:ea typeface="+mn-ea"/>
+        <a:cs typeface="+mn-cs"/>
+      </a:defRPr>
+    </a:lvl5pPr>
+    <a:lvl6pPr marL="2286000" algn="l" defTabSz="914400" rtl="0" eaLnBrk="1" latinLnBrk="0" hangingPunct="1">
+      <a:defRPr sz="1200" kern="1200">
+        <a:solidFill>
+          <a:schemeClr val="tx1"/>
+        </a:solidFill>
+        <a:latin typeface="+mn-lt"/>
+        <a:ea typeface="+mn-ea"/>
+        <a:cs typeface="+mn-cs"/>
+      </a:defRPr>
+    </a:lvl6pPr>
+    <a:lvl7pPr marL="2743200" algn="l" defTabSz="914400" rtl="0" eaLnBrk="1" latinLnBrk="0" hangingPunct="1">
+      <a:defRPr sz="1200" kern="1200">
+        <a:solidFill>
+          <a:schemeClr val="tx1"/>
+        </a:solidFill>
+        <a:latin typeface="+mn-lt"/>
+        <a:ea typeface="+mn-ea"/>
+        <a:cs typeface="+mn-cs"/>
+      </a:defRPr>
+    </a:lvl7pPr>
+    <a:lvl8pPr marL="3200400" algn="l" defTabSz="914400" rtl="0" eaLnBrk="1" latinLnBrk="0" hangingPunct="1">
+      <a:defRPr sz="1200" kern="1200">
+        <a:solidFill>
+          <a:schemeClr val="tx1"/>
+        </a:solidFill>
+        <a:latin typeface="+mn-lt"/>
+        <a:ea typeface="+mn-ea"/>
+        <a:cs typeface="+mn-cs"/>
+      </a:defRPr>
+    </a:lvl8pPr>
+    <a:lvl9pPr marL="3657600" algn="l" defTabSz="914400" rtl="0" eaLnBrk="1" latinLnBrk="0" hangingPunct="1">
+      <a:defRPr sz="1200" kern="1200">
+        <a:solidFill>
+          <a:schemeClr val="tx1"/>
+        </a:solidFill>
+        <a:latin typeface="+mn-lt"/>
+        <a:ea typeface="+mn-ea"/>
+        <a:cs typeface="+mn-cs"/>
+      </a:defRPr>
+    </a:lvl9pPr>
+  </p:notesStyle>
+</p:notesMaster>
+</file>
+
+<file path=ppt/notesSlides/notesSlide1.xml><?xml version="1.0" encoding="utf-8"?>
+<p:notes xmlns:a="http://schemas.openxmlformats.org/drawingml/2006/main" xmlns:r="http://schemas.openxmlformats.org/officeDocument/2006/relationships" xmlns:p="http://schemas.openxmlformats.org/presentationml/2006/main">
+  <p:cSld>
+    <p:spTree>
+      <p:nvGrpSpPr>
+        <p:cNvPr id="1" name=""/>
+        <p:cNvGrpSpPr/>
+        <p:nvPr/>
+      </p:nvGrpSpPr>
+      <p:grpSpPr>
+        <a:xfrm>
+          <a:off x="0" y="0"/>
+          <a:ext cx="0" cy="0"/>
+          <a:chOff x="0" y="0"/>
+          <a:chExt cx="0" cy="0"/>
+        </a:xfrm>
+      </p:grpSpPr>
+      <p:sp>
+        <p:nvSpPr>
+          <p:cNvPr id="2" name="Slide Image Placeholder 1"/>
+          <p:cNvSpPr>
+            <a:spLocks noGrp="1" noRot="1" noChangeAspect="1"/>
+          </p:cNvSpPr>
+          <p:nvPr>
+            <p:ph type="sldImg"/>
+          </p:nvPr>
+        </p:nvSpPr>
+        <p:spPr/>
+      </p:sp>
+      <p:sp>
+        <p:nvSpPr>
+          <p:cNvPr id="3" name="Notes Placeholder 2"/>
+          <p:cNvSpPr>
+            <a:spLocks noGrp="1"/>
+          </p:cNvSpPr>
+          <p:nvPr>
+            <p:ph type="body" idx="1"/>
+          </p:nvPr>
+        </p:nvSpPr>
+        <p:spPr/>
+        <p:txBody>
+          <a:bodyPr/>
+          <a:lstStyle/>
+          <a:p>
+            <a:r>
+              <a:rPr lang="en-US" dirty="0" smtClean="0"/>
+              <a:t>User sets interval</a:t>
+            </a:r>
+            <a:r>
+              <a:rPr lang="en-US" baseline="0" dirty="0" smtClean="0"/>
+              <a:t> for checking site-&gt;Application loops through all users-&gt;if time for update check, look on site-&gt;if changed, update Course entry and send message to user</a:t>
+            </a:r>
+            <a:endParaRPr lang="en-US" dirty="0"/>
+          </a:p>
+        </p:txBody>
+      </p:sp>
+      <p:sp>
+        <p:nvSpPr>
+          <p:cNvPr id="4" name="Slide Number Placeholder 3"/>
+          <p:cNvSpPr>
+            <a:spLocks noGrp="1"/>
+          </p:cNvSpPr>
+          <p:nvPr>
+            <p:ph type="sldNum" sz="quarter" idx="10"/>
+          </p:nvPr>
+        </p:nvSpPr>
+        <p:spPr/>
+        <p:txBody>
+          <a:bodyPr/>
+          <a:lstStyle/>
+          <a:p>
+            <a:fld id="{3485A29B-357A-4063-A4EA-E6DDBC92BB77}" type="slidenum">
+              <a:rPr lang="en-US" smtClean="0"/>
+              <a:t>4</a:t>
+            </a:fld>
+            <a:endParaRPr lang="en-US"/>
+          </a:p>
+        </p:txBody>
+      </p:sp>
+    </p:spTree>
+    <p:extLst>
+      <p:ext uri="{BB962C8B-B14F-4D97-AF65-F5344CB8AC3E}">
+        <p14:creationId xmlns:p14="http://schemas.microsoft.com/office/powerpoint/2010/main" val="2061364425"/>
+      </p:ext>
+    </p:extLst>
+  </p:cSld>
+  <p:clrMapOvr>
+    <a:masterClrMapping/>
+  </p:clrMapOvr>
+</p:notes>
 </file>
 
 <file path=ppt/slideLayouts/slideLayout1.xml><?xml version="1.0" encoding="utf-8"?>
@@ -400,7 +861,7 @@
           <a:p>
             <a:fld id="{B01F9CA3-105E-4857-9057-6DB6197DA786}" type="datetimeFigureOut">
               <a:rPr lang="en-US" smtClean="0"/>
-              <a:t>10/29/13</a:t>
+              <a:t>10/29/2013</a:t>
             </a:fld>
             <a:endParaRPr lang="en-US"/>
           </a:p>
@@ -592,7 +1053,7 @@
           <a:p>
             <a:fld id="{B01F9CA3-105E-4857-9057-6DB6197DA786}" type="datetimeFigureOut">
               <a:rPr lang="en-US" smtClean="0"/>
-              <a:t>10/29/13</a:t>
+              <a:t>10/29/2013</a:t>
             </a:fld>
             <a:endParaRPr lang="en-US"/>
           </a:p>
@@ -861,7 +1322,7 @@
           <a:p>
             <a:fld id="{B01F9CA3-105E-4857-9057-6DB6197DA786}" type="datetimeFigureOut">
               <a:rPr lang="en-US" smtClean="0"/>
-              <a:t>10/29/13</a:t>
+              <a:t>10/29/2013</a:t>
             </a:fld>
             <a:endParaRPr lang="en-US"/>
           </a:p>
@@ -1040,7 +1501,7 @@
           <a:p>
             <a:fld id="{B01F9CA3-105E-4857-9057-6DB6197DA786}" type="datetimeFigureOut">
               <a:rPr lang="en-US" smtClean="0"/>
-              <a:t>10/29/13</a:t>
+              <a:t>10/29/2013</a:t>
             </a:fld>
             <a:endParaRPr lang="en-US"/>
           </a:p>
@@ -1235,7 +1696,7 @@
                 <a:latin typeface="Calibri"/>
               </a:rPr>
               <a:pPr/>
-              <a:t>10/29/13</a:t>
+              <a:t>10/29/2013</a:t>
             </a:fld>
             <a:endParaRPr lang="en-US">
               <a:solidFill>
@@ -1442,7 +1903,7 @@
                 <a:latin typeface="Calibri"/>
               </a:rPr>
               <a:pPr/>
-              <a:t>10/29/13</a:t>
+              <a:t>10/29/2013</a:t>
             </a:fld>
             <a:endParaRPr lang="en-US">
               <a:solidFill>
@@ -1725,7 +2186,7 @@
                 <a:latin typeface="Calibri"/>
               </a:rPr>
               <a:pPr/>
-              <a:t>10/29/13</a:t>
+              <a:t>10/29/2013</a:t>
             </a:fld>
             <a:endParaRPr lang="en-US">
               <a:solidFill>
@@ -1994,7 +2455,7 @@
                 <a:latin typeface="Calibri"/>
               </a:rPr>
               <a:pPr/>
-              <a:t>10/29/13</a:t>
+              <a:t>10/29/2013</a:t>
             </a:fld>
             <a:endParaRPr lang="en-US">
               <a:solidFill>
@@ -2398,7 +2859,7 @@
                 <a:latin typeface="Calibri"/>
               </a:rPr>
               <a:pPr/>
-              <a:t>10/29/13</a:t>
+              <a:t>10/29/2013</a:t>
             </a:fld>
             <a:endParaRPr lang="en-US">
               <a:solidFill>
@@ -2553,7 +3014,7 @@
                 <a:latin typeface="Calibri"/>
               </a:rPr>
               <a:pPr/>
-              <a:t>10/29/13</a:t>
+              <a:t>10/29/2013</a:t>
             </a:fld>
             <a:endParaRPr lang="en-US">
               <a:solidFill>
@@ -2685,7 +3146,7 @@
                 <a:latin typeface="Calibri"/>
               </a:rPr>
               <a:pPr/>
-              <a:t>10/29/13</a:t>
+              <a:t>10/29/2013</a:t>
             </a:fld>
             <a:endParaRPr lang="en-US">
               <a:solidFill>
@@ -2888,7 +3349,7 @@
           <a:p>
             <a:fld id="{B01F9CA3-105E-4857-9057-6DB6197DA786}" type="datetimeFigureOut">
               <a:rPr lang="en-US" smtClean="0"/>
-              <a:t>10/29/13</a:t>
+              <a:t>10/29/2013</a:t>
             </a:fld>
             <a:endParaRPr lang="en-US"/>
           </a:p>
@@ -3168,7 +3629,7 @@
                 <a:latin typeface="Calibri"/>
               </a:rPr>
               <a:pPr/>
-              <a:t>10/29/13</a:t>
+              <a:t>10/29/2013</a:t>
             </a:fld>
             <a:endParaRPr lang="en-US">
               <a:solidFill>
@@ -3458,7 +3919,7 @@
                 <a:latin typeface="Calibri"/>
               </a:rPr>
               <a:pPr/>
-              <a:t>10/29/13</a:t>
+              <a:t>10/29/2013</a:t>
             </a:fld>
             <a:endParaRPr lang="en-US">
               <a:solidFill>
@@ -3665,7 +4126,7 @@
                 <a:latin typeface="Calibri"/>
               </a:rPr>
               <a:pPr/>
-              <a:t>10/29/13</a:t>
+              <a:t>10/29/2013</a:t>
             </a:fld>
             <a:endParaRPr lang="en-US">
               <a:solidFill>
@@ -3882,7 +4343,7 @@
                 <a:latin typeface="Calibri"/>
               </a:rPr>
               <a:pPr/>
-              <a:t>10/29/13</a:t>
+              <a:t>10/29/2013</a:t>
             </a:fld>
             <a:endParaRPr lang="en-US">
               <a:solidFill>
@@ -4111,7 +4572,7 @@
                 <a:latin typeface="Calibri"/>
               </a:rPr>
               <a:pPr/>
-              <a:t>10/29/13</a:t>
+              <a:t>10/29/2013</a:t>
             </a:fld>
             <a:endParaRPr lang="en-US">
               <a:solidFill>
@@ -4318,7 +4779,7 @@
                 <a:latin typeface="Calibri"/>
               </a:rPr>
               <a:pPr/>
-              <a:t>10/29/13</a:t>
+              <a:t>10/29/2013</a:t>
             </a:fld>
             <a:endParaRPr lang="en-US">
               <a:solidFill>
@@ -4601,7 +5062,7 @@
                 <a:latin typeface="Calibri"/>
               </a:rPr>
               <a:pPr/>
-              <a:t>10/29/13</a:t>
+              <a:t>10/29/2013</a:t>
             </a:fld>
             <a:endParaRPr lang="en-US">
               <a:solidFill>
@@ -4870,7 +5331,7 @@
                 <a:latin typeface="Calibri"/>
               </a:rPr>
               <a:pPr/>
-              <a:t>10/29/13</a:t>
+              <a:t>10/29/2013</a:t>
             </a:fld>
             <a:endParaRPr lang="en-US">
               <a:solidFill>
@@ -5274,7 +5735,7 @@
                 <a:latin typeface="Calibri"/>
               </a:rPr>
               <a:pPr/>
-              <a:t>10/29/13</a:t>
+              <a:t>10/29/2013</a:t>
             </a:fld>
             <a:endParaRPr lang="en-US">
               <a:solidFill>
@@ -5429,7 +5890,7 @@
                 <a:latin typeface="Calibri"/>
               </a:rPr>
               <a:pPr/>
-              <a:t>10/29/13</a:t>
+              <a:t>10/29/2013</a:t>
             </a:fld>
             <a:endParaRPr lang="en-US">
               <a:solidFill>
@@ -5705,7 +6166,7 @@
           <a:p>
             <a:fld id="{B01F9CA3-105E-4857-9057-6DB6197DA786}" type="datetimeFigureOut">
               <a:rPr lang="en-US" smtClean="0"/>
-              <a:t>10/29/13</a:t>
+              <a:t>10/29/2013</a:t>
             </a:fld>
             <a:endParaRPr lang="en-US"/>
           </a:p>
@@ -5880,7 +6341,7 @@
                 <a:latin typeface="Calibri"/>
               </a:rPr>
               <a:pPr/>
-              <a:t>10/29/13</a:t>
+              <a:t>10/29/2013</a:t>
             </a:fld>
             <a:endParaRPr lang="en-US">
               <a:solidFill>
@@ -6194,7 +6655,7 @@
                 <a:latin typeface="Calibri"/>
               </a:rPr>
               <a:pPr/>
-              <a:t>10/29/13</a:t>
+              <a:t>10/29/2013</a:t>
             </a:fld>
             <a:endParaRPr lang="en-US">
               <a:solidFill>
@@ -6484,7 +6945,7 @@
                 <a:latin typeface="Calibri"/>
               </a:rPr>
               <a:pPr/>
-              <a:t>10/29/13</a:t>
+              <a:t>10/29/2013</a:t>
             </a:fld>
             <a:endParaRPr lang="en-US">
               <a:solidFill>
@@ -6691,7 +7152,7 @@
                 <a:latin typeface="Calibri"/>
               </a:rPr>
               <a:pPr/>
-              <a:t>10/29/13</a:t>
+              <a:t>10/29/2013</a:t>
             </a:fld>
             <a:endParaRPr lang="en-US">
               <a:solidFill>
@@ -6908,7 +7369,7 @@
                 <a:latin typeface="Calibri"/>
               </a:rPr>
               <a:pPr/>
-              <a:t>10/29/13</a:t>
+              <a:t>10/29/2013</a:t>
             </a:fld>
             <a:endParaRPr lang="en-US">
               <a:solidFill>
@@ -7188,7 +7649,7 @@
           <a:p>
             <a:fld id="{B01F9CA3-105E-4857-9057-6DB6197DA786}" type="datetimeFigureOut">
               <a:rPr lang="en-US" smtClean="0"/>
-              <a:t>10/29/13</a:t>
+              <a:t>10/29/2013</a:t>
             </a:fld>
             <a:endParaRPr lang="en-US"/>
           </a:p>
@@ -7486,7 +7947,7 @@
           <a:p>
             <a:fld id="{B01F9CA3-105E-4857-9057-6DB6197DA786}" type="datetimeFigureOut">
               <a:rPr lang="en-US" smtClean="0"/>
-              <a:t>10/29/13</a:t>
+              <a:t>10/29/2013</a:t>
             </a:fld>
             <a:endParaRPr lang="en-US"/>
           </a:p>
@@ -7942,7 +8403,7 @@
           <a:p>
             <a:fld id="{B01F9CA3-105E-4857-9057-6DB6197DA786}" type="datetimeFigureOut">
               <a:rPr lang="en-US" smtClean="0"/>
-              <a:t>10/29/13</a:t>
+              <a:t>10/29/2013</a:t>
             </a:fld>
             <a:endParaRPr lang="en-US"/>
           </a:p>
@@ -8055,7 +8516,7 @@
           <a:p>
             <a:fld id="{B01F9CA3-105E-4857-9057-6DB6197DA786}" type="datetimeFigureOut">
               <a:rPr lang="en-US" smtClean="0"/>
-              <a:t>10/29/13</a:t>
+              <a:t>10/29/2013</a:t>
             </a:fld>
             <a:endParaRPr lang="en-US"/>
           </a:p>
@@ -8145,7 +8606,7 @@
           <a:p>
             <a:fld id="{B01F9CA3-105E-4857-9057-6DB6197DA786}" type="datetimeFigureOut">
               <a:rPr lang="en-US" smtClean="0"/>
-              <a:t>10/29/13</a:t>
+              <a:t>10/29/2013</a:t>
             </a:fld>
             <a:endParaRPr lang="en-US"/>
           </a:p>
@@ -8427,7 +8888,7 @@
           <a:p>
             <a:fld id="{B01F9CA3-105E-4857-9057-6DB6197DA786}" type="datetimeFigureOut">
               <a:rPr lang="en-US" smtClean="0"/>
-              <a:t>10/29/13</a:t>
+              <a:t>10/29/2013</a:t>
             </a:fld>
             <a:endParaRPr lang="en-US"/>
           </a:p>
@@ -8638,7 +9099,7 @@
           <a:p>
             <a:fld id="{B01F9CA3-105E-4857-9057-6DB6197DA786}" type="datetimeFigureOut">
               <a:rPr lang="en-US" smtClean="0"/>
-              <a:t>10/29/13</a:t>
+              <a:t>10/29/2013</a:t>
             </a:fld>
             <a:endParaRPr lang="en-US"/>
           </a:p>
@@ -9236,7 +9697,7 @@
                 <a:latin typeface="Calibri"/>
               </a:rPr>
               <a:pPr defTabSz="685783"/>
-              <a:t>10/29/13</a:t>
+              <a:t>10/29/2013</a:t>
             </a:fld>
             <a:endParaRPr lang="en-US">
               <a:solidFill>
@@ -9816,7 +10277,7 @@
                 <a:latin typeface="Calibri"/>
               </a:rPr>
               <a:pPr defTabSz="685800"/>
-              <a:t>10/29/13</a:t>
+              <a:t>10/29/2013</a:t>
             </a:fld>
             <a:endParaRPr lang="en-US">
               <a:solidFill>
@@ -10298,13 +10759,6 @@
               </a:rPr>
               <a:t>Course Availability Progress Report</a:t>
             </a:r>
-            <a:endParaRPr lang="en-US" sz="4400" dirty="0">
-              <a:solidFill>
-                <a:schemeClr val="tx1"/>
-              </a:solidFill>
-              <a:latin typeface="Calibri Light"/>
-              <a:cs typeface="Calibri Light"/>
-            </a:endParaRPr>
           </a:p>
         </p:txBody>
       </p:sp>
@@ -10585,13 +11039,6 @@
               </a:rPr>
               <a:t> Ogata, and Hansen Cheng</a:t>
             </a:r>
-            <a:endParaRPr lang="en-US" sz="4400" dirty="0">
-              <a:solidFill>
-                <a:schemeClr val="tx1"/>
-              </a:solidFill>
-              <a:latin typeface="Calibri Light"/>
-              <a:cs typeface="Calibri Light"/>
-            </a:endParaRPr>
           </a:p>
         </p:txBody>
       </p:sp>
@@ -10605,6 +11052,13 @@
   <p:clrMapOvr>
     <a:masterClrMapping/>
   </p:clrMapOvr>
+  <p:timing>
+    <p:tnLst>
+      <p:par>
+        <p:cTn id="1" dur="indefinite" restart="never" nodeType="tmRoot"/>
+      </p:par>
+    </p:tnLst>
+  </p:timing>
 </p:sld>
 </file>
 
@@ -10720,7 +11174,7 @@
   <p:timing>
     <p:tnLst>
       <p:par>
-        <p:cTn xmlns:p14="http://schemas.microsoft.com/office/powerpoint/2010/main" id="1" dur="indefinite" restart="never" nodeType="tmRoot"/>
+        <p:cTn id="1" dur="indefinite" restart="never" nodeType="tmRoot"/>
       </p:par>
     </p:tnLst>
   </p:timing>
@@ -10773,10 +11227,6 @@
               </a:rPr>
               <a:t>Technology</a:t>
             </a:r>
-            <a:endParaRPr lang="en-US" sz="4000" dirty="0">
-              <a:latin typeface="Calibri Light"/>
-              <a:cs typeface="Calibri Light"/>
-            </a:endParaRPr>
           </a:p>
         </p:txBody>
       </p:sp>
@@ -10809,10 +11259,6 @@
               </a:rPr>
               <a:t>Ruby on Rails because it provides an organized structure for web development. It also provides Bootstrap (through the installation of gems) for responsiveness</a:t>
             </a:r>
-            <a:endParaRPr lang="en-US" sz="3000" dirty="0">
-              <a:latin typeface="Calibri Light"/>
-              <a:cs typeface="Calibri Light"/>
-            </a:endParaRPr>
           </a:p>
         </p:txBody>
       </p:sp>
@@ -10843,26 +11289,8 @@
                 <a:latin typeface="Calibri Light"/>
                 <a:cs typeface="Calibri Light"/>
               </a:rPr>
-              <a:t>Use of a dummy email on </a:t>
-            </a:r>
-            <a:r>
-              <a:rPr lang="en-US" sz="3000" dirty="0">
-                <a:latin typeface="Calibri Light"/>
-                <a:cs typeface="Calibri Light"/>
-              </a:rPr>
-              <a:t>G</a:t>
-            </a:r>
-            <a:r>
-              <a:rPr lang="en-US" sz="3000" dirty="0">
-                <a:latin typeface="Calibri Light"/>
-                <a:cs typeface="Calibri Light"/>
-              </a:rPr>
-              <a:t>mail for testing (in upcoming weeks) of notification system.</a:t>
-            </a:r>
-            <a:endParaRPr lang="en-US" sz="3000" dirty="0">
-              <a:latin typeface="Calibri Light"/>
-              <a:cs typeface="Calibri Light"/>
-            </a:endParaRPr>
+              <a:t>Use of a dummy email on Gmail for testing (in upcoming weeks) of notification system.</a:t>
+            </a:r>
           </a:p>
         </p:txBody>
       </p:sp>
@@ -10876,6 +11304,13 @@
   <p:clrMapOvr>
     <a:masterClrMapping/>
   </p:clrMapOvr>
+  <p:timing>
+    <p:tnLst>
+      <p:par>
+        <p:cTn id="1" dur="indefinite" restart="never" nodeType="tmRoot"/>
+      </p:par>
+    </p:tnLst>
+  </p:timing>
 </p:sld>
 </file>
 
@@ -11115,15 +11550,15 @@
         <p:nvCxnSpPr>
           <p:cNvPr id="17" name="Straight Arrow Connector 16"/>
           <p:cNvCxnSpPr>
-            <a:stCxn id="8" idx="3"/>
-            <a:endCxn id="10" idx="0"/>
+            <a:stCxn id="8" idx="2"/>
+            <a:endCxn id="9" idx="0"/>
           </p:cNvCxnSpPr>
           <p:nvPr/>
         </p:nvCxnSpPr>
         <p:spPr>
           <a:xfrm>
-            <a:off x="4161559" y="1453429"/>
-            <a:ext cx="1075458" cy="468890"/>
+            <a:off x="3343277" y="1706709"/>
+            <a:ext cx="0" cy="215612"/>
           </a:xfrm>
           <a:prstGeom prst="straightConnector1">
             <a:avLst/>
@@ -11152,15 +11587,15 @@
         <p:nvCxnSpPr>
           <p:cNvPr id="20" name="Straight Arrow Connector 19"/>
           <p:cNvCxnSpPr>
-            <a:stCxn id="10" idx="1"/>
-            <a:endCxn id="9" idx="3"/>
+            <a:stCxn id="9" idx="3"/>
+            <a:endCxn id="10" idx="1"/>
           </p:cNvCxnSpPr>
           <p:nvPr/>
         </p:nvCxnSpPr>
         <p:spPr>
-          <a:xfrm flipH="1">
-            <a:off x="4161559" y="2175598"/>
-            <a:ext cx="257174" cy="0"/>
+          <a:xfrm>
+            <a:off x="4161561" y="2175600"/>
+            <a:ext cx="257173" cy="0"/>
           </a:xfrm>
           <a:prstGeom prst="straightConnector1">
             <a:avLst/>
@@ -11233,7 +11668,7 @@
   <p:timing>
     <p:tnLst>
       <p:par>
-        <p:cTn xmlns:p14="http://schemas.microsoft.com/office/powerpoint/2010/main" id="1" dur="indefinite" restart="never" nodeType="tmRoot"/>
+        <p:cTn id="1" dur="indefinite" restart="never" nodeType="tmRoot"/>
       </p:par>
     </p:tnLst>
   </p:timing>
@@ -11266,7 +11701,7 @@
           <p:nvPr/>
         </p:nvPicPr>
         <p:blipFill>
-          <a:blip r:embed="rId2">
+          <a:blip r:embed="rId2" cstate="email">
             <a:extLst>
               <a:ext uri="{28A0092B-C50C-407E-A947-70E740481C1C}">
                 <a14:useLocalDpi xmlns:a14="http://schemas.microsoft.com/office/drawing/2010/main" val="0"/>
@@ -11297,6 +11732,13 @@
   <p:clrMapOvr>
     <a:masterClrMapping/>
   </p:clrMapOvr>
+  <p:timing>
+    <p:tnLst>
+      <p:par>
+        <p:cTn id="1" dur="indefinite" restart="never" nodeType="tmRoot"/>
+      </p:par>
+    </p:tnLst>
+  </p:timing>
 </p:sld>
 </file>
 
@@ -11326,7 +11768,7 @@
           <p:nvPr/>
         </p:nvPicPr>
         <p:blipFill>
-          <a:blip r:embed="rId2">
+          <a:blip r:embed="rId2" cstate="email">
             <a:extLst>
               <a:ext uri="{28A0092B-C50C-407E-A947-70E740481C1C}">
                 <a14:useLocalDpi xmlns:a14="http://schemas.microsoft.com/office/drawing/2010/main" val="0"/>
@@ -11357,6 +11799,13 @@
   <p:clrMapOvr>
     <a:masterClrMapping/>
   </p:clrMapOvr>
+  <p:timing>
+    <p:tnLst>
+      <p:par>
+        <p:cTn id="1" dur="indefinite" restart="never" nodeType="tmRoot"/>
+      </p:par>
+    </p:tnLst>
+  </p:timing>
 </p:sld>
 </file>
 
@@ -11386,7 +11835,7 @@
           <p:nvPr/>
         </p:nvPicPr>
         <p:blipFill>
-          <a:blip r:embed="rId2">
+          <a:blip r:embed="rId2" cstate="email">
             <a:extLst>
               <a:ext uri="{28A0092B-C50C-407E-A947-70E740481C1C}">
                 <a14:useLocalDpi xmlns:a14="http://schemas.microsoft.com/office/drawing/2010/main" val="0"/>
@@ -11417,6 +11866,13 @@
   <p:clrMapOvr>
     <a:masterClrMapping/>
   </p:clrMapOvr>
+  <p:timing>
+    <p:tnLst>
+      <p:par>
+        <p:cTn id="1" dur="indefinite" restart="never" nodeType="tmRoot"/>
+      </p:par>
+    </p:tnLst>
+  </p:timing>
 </p:sld>
 </file>
 
@@ -11446,7 +11902,7 @@
           <p:nvPr/>
         </p:nvPicPr>
         <p:blipFill>
-          <a:blip r:embed="rId2">
+          <a:blip r:embed="rId2" cstate="email">
             <a:extLst>
               <a:ext uri="{28A0092B-C50C-407E-A947-70E740481C1C}">
                 <a14:useLocalDpi xmlns:a14="http://schemas.microsoft.com/office/drawing/2010/main" val="0"/>
@@ -11477,6 +11933,13 @@
   <p:clrMapOvr>
     <a:masterClrMapping/>
   </p:clrMapOvr>
+  <p:timing>
+    <p:tnLst>
+      <p:par>
+        <p:cTn id="1" dur="indefinite" restart="never" nodeType="tmRoot"/>
+      </p:par>
+    </p:tnLst>
+  </p:timing>
 </p:sld>
 </file>
 
@@ -11537,6 +12000,13 @@
   <p:clrMapOvr>
     <a:masterClrMapping/>
   </p:clrMapOvr>
+  <p:timing>
+    <p:tnLst>
+      <p:par>
+        <p:cTn id="1" dur="indefinite" restart="never" nodeType="tmRoot"/>
+      </p:par>
+    </p:tnLst>
+  </p:timing>
 </p:sld>
 </file>
 
@@ -12061,7 +12531,7 @@
   <a:extraClrSchemeLst/>
   <a:extLst>
     <a:ext uri="{05A4C25C-085E-4340-85A3-A5531E510DB2}">
-      <thm15:themeFamily xmlns:thm15="http://schemas.microsoft.com/office/thememl/2012/main" xmlns="" name="Office Theme" id="{62F939B6-93AF-4DB8-9C6B-D6C7DFDC589F}" vid="{4A3C46E8-61CC-4603-A589-7422A47A8E4A}"/>
+      <thm15:themeFamily xmlns:thm15="http://schemas.microsoft.com/office/thememl/2012/main" name="Office Theme" id="{62F939B6-93AF-4DB8-9C6B-D6C7DFDC589F}" vid="{4A3C46E8-61CC-4603-A589-7422A47A8E4A}"/>
     </a:ext>
   </a:extLst>
 </a:theme>
@@ -12322,7 +12792,268 @@
   <a:extraClrSchemeLst/>
   <a:extLst>
     <a:ext uri="{05A4C25C-085E-4340-85A3-A5531E510DB2}">
-      <thm15:themeFamily xmlns:thm15="http://schemas.microsoft.com/office/thememl/2012/main" xmlns="" name="Office Theme" id="{62F939B6-93AF-4DB8-9C6B-D6C7DFDC589F}" vid="{4A3C46E8-61CC-4603-A589-7422A47A8E4A}"/>
+      <thm15:themeFamily xmlns:thm15="http://schemas.microsoft.com/office/thememl/2012/main" name="Office Theme" id="{62F939B6-93AF-4DB8-9C6B-D6C7DFDC589F}" vid="{4A3C46E8-61CC-4603-A589-7422A47A8E4A}"/>
+    </a:ext>
+  </a:extLst>
+</a:theme>
+</file>
+
+<file path=ppt/theme/theme4.xml><?xml version="1.0" encoding="utf-8"?>
+<a:theme xmlns:a="http://schemas.openxmlformats.org/drawingml/2006/main" name="Office Theme">
+  <a:themeElements>
+    <a:clrScheme name="Office">
+      <a:dk1>
+        <a:sysClr val="windowText" lastClr="000000"/>
+      </a:dk1>
+      <a:lt1>
+        <a:sysClr val="window" lastClr="FFFFFF"/>
+      </a:lt1>
+      <a:dk2>
+        <a:srgbClr val="44546A"/>
+      </a:dk2>
+      <a:lt2>
+        <a:srgbClr val="E7E6E6"/>
+      </a:lt2>
+      <a:accent1>
+        <a:srgbClr val="5B9BD5"/>
+      </a:accent1>
+      <a:accent2>
+        <a:srgbClr val="ED7D31"/>
+      </a:accent2>
+      <a:accent3>
+        <a:srgbClr val="A5A5A5"/>
+      </a:accent3>
+      <a:accent4>
+        <a:srgbClr val="FFC000"/>
+      </a:accent4>
+      <a:accent5>
+        <a:srgbClr val="4472C4"/>
+      </a:accent5>
+      <a:accent6>
+        <a:srgbClr val="70AD47"/>
+      </a:accent6>
+      <a:hlink>
+        <a:srgbClr val="0563C1"/>
+      </a:hlink>
+      <a:folHlink>
+        <a:srgbClr val="954F72"/>
+      </a:folHlink>
+    </a:clrScheme>
+    <a:fontScheme name="Office">
+      <a:majorFont>
+        <a:latin typeface="Calibri Light" panose="020F0302020204030204"/>
+        <a:ea typeface=""/>
+        <a:cs typeface=""/>
+        <a:font script="Jpan" typeface="ＭＳ Ｐゴシック"/>
+        <a:font script="Hang" typeface="맑은 고딕"/>
+        <a:font script="Hans" typeface="宋体"/>
+        <a:font script="Hant" typeface="新細明體"/>
+        <a:font script="Arab" typeface="Times New Roman"/>
+        <a:font script="Hebr" typeface="Times New Roman"/>
+        <a:font script="Thai" typeface="Angsana New"/>
+        <a:font script="Ethi" typeface="Nyala"/>
+        <a:font script="Beng" typeface="Vrinda"/>
+        <a:font script="Gujr" typeface="Shruti"/>
+        <a:font script="Khmr" typeface="MoolBoran"/>
+        <a:font script="Knda" typeface="Tunga"/>
+        <a:font script="Guru" typeface="Raavi"/>
+        <a:font script="Cans" typeface="Euphemia"/>
+        <a:font script="Cher" typeface="Plantagenet Cherokee"/>
+        <a:font script="Yiii" typeface="Microsoft Yi Baiti"/>
+        <a:font script="Tibt" typeface="Microsoft Himalaya"/>
+        <a:font script="Thaa" typeface="MV Boli"/>
+        <a:font script="Deva" typeface="Mangal"/>
+        <a:font script="Telu" typeface="Gautami"/>
+        <a:font script="Taml" typeface="Latha"/>
+        <a:font script="Syrc" typeface="Estrangelo Edessa"/>
+        <a:font script="Orya" typeface="Kalinga"/>
+        <a:font script="Mlym" typeface="Kartika"/>
+        <a:font script="Laoo" typeface="DokChampa"/>
+        <a:font script="Sinh" typeface="Iskoola Pota"/>
+        <a:font script="Mong" typeface="Mongolian Baiti"/>
+        <a:font script="Viet" typeface="Times New Roman"/>
+        <a:font script="Uigh" typeface="Microsoft Uighur"/>
+        <a:font script="Geor" typeface="Sylfaen"/>
+      </a:majorFont>
+      <a:minorFont>
+        <a:latin typeface="Calibri" panose="020F0502020204030204"/>
+        <a:ea typeface=""/>
+        <a:cs typeface=""/>
+        <a:font script="Jpan" typeface="ＭＳ Ｐゴシック"/>
+        <a:font script="Hang" typeface="맑은 고딕"/>
+        <a:font script="Hans" typeface="宋体"/>
+        <a:font script="Hant" typeface="新細明體"/>
+        <a:font script="Arab" typeface="Arial"/>
+        <a:font script="Hebr" typeface="Arial"/>
+        <a:font script="Thai" typeface="Cordia New"/>
+        <a:font script="Ethi" typeface="Nyala"/>
+        <a:font script="Beng" typeface="Vrinda"/>
+        <a:font script="Gujr" typeface="Shruti"/>
+        <a:font script="Khmr" typeface="DaunPenh"/>
+        <a:font script="Knda" typeface="Tunga"/>
+        <a:font script="Guru" typeface="Raavi"/>
+        <a:font script="Cans" typeface="Euphemia"/>
+        <a:font script="Cher" typeface="Plantagenet Cherokee"/>
+        <a:font script="Yiii" typeface="Microsoft Yi Baiti"/>
+        <a:font script="Tibt" typeface="Microsoft Himalaya"/>
+        <a:font script="Thaa" typeface="MV Boli"/>
+        <a:font script="Deva" typeface="Mangal"/>
+        <a:font script="Telu" typeface="Gautami"/>
+        <a:font script="Taml" typeface="Latha"/>
+        <a:font script="Syrc" typeface="Estrangelo Edessa"/>
+        <a:font script="Orya" typeface="Kalinga"/>
+        <a:font script="Mlym" typeface="Kartika"/>
+        <a:font script="Laoo" typeface="DokChampa"/>
+        <a:font script="Sinh" typeface="Iskoola Pota"/>
+        <a:font script="Mong" typeface="Mongolian Baiti"/>
+        <a:font script="Viet" typeface="Arial"/>
+        <a:font script="Uigh" typeface="Microsoft Uighur"/>
+        <a:font script="Geor" typeface="Sylfaen"/>
+      </a:minorFont>
+    </a:fontScheme>
+    <a:fmtScheme name="Office">
+      <a:fillStyleLst>
+        <a:solidFill>
+          <a:schemeClr val="phClr"/>
+        </a:solidFill>
+        <a:gradFill rotWithShape="1">
+          <a:gsLst>
+            <a:gs pos="0">
+              <a:schemeClr val="phClr">
+                <a:lumMod val="110000"/>
+                <a:satMod val="105000"/>
+                <a:tint val="67000"/>
+              </a:schemeClr>
+            </a:gs>
+            <a:gs pos="50000">
+              <a:schemeClr val="phClr">
+                <a:lumMod val="105000"/>
+                <a:satMod val="103000"/>
+                <a:tint val="73000"/>
+              </a:schemeClr>
+            </a:gs>
+            <a:gs pos="100000">
+              <a:schemeClr val="phClr">
+                <a:lumMod val="105000"/>
+                <a:satMod val="109000"/>
+                <a:tint val="81000"/>
+              </a:schemeClr>
+            </a:gs>
+          </a:gsLst>
+          <a:lin ang="5400000" scaled="0"/>
+        </a:gradFill>
+        <a:gradFill rotWithShape="1">
+          <a:gsLst>
+            <a:gs pos="0">
+              <a:schemeClr val="phClr">
+                <a:satMod val="103000"/>
+                <a:lumMod val="102000"/>
+                <a:tint val="94000"/>
+              </a:schemeClr>
+            </a:gs>
+            <a:gs pos="50000">
+              <a:schemeClr val="phClr">
+                <a:satMod val="110000"/>
+                <a:lumMod val="100000"/>
+                <a:shade val="100000"/>
+              </a:schemeClr>
+            </a:gs>
+            <a:gs pos="100000">
+              <a:schemeClr val="phClr">
+                <a:lumMod val="99000"/>
+                <a:satMod val="120000"/>
+                <a:shade val="78000"/>
+              </a:schemeClr>
+            </a:gs>
+          </a:gsLst>
+          <a:lin ang="5400000" scaled="0"/>
+        </a:gradFill>
+      </a:fillStyleLst>
+      <a:lnStyleLst>
+        <a:ln w="6350" cap="flat" cmpd="sng" algn="ctr">
+          <a:solidFill>
+            <a:schemeClr val="phClr"/>
+          </a:solidFill>
+          <a:prstDash val="solid"/>
+          <a:miter lim="800000"/>
+        </a:ln>
+        <a:ln w="12700" cap="flat" cmpd="sng" algn="ctr">
+          <a:solidFill>
+            <a:schemeClr val="phClr"/>
+          </a:solidFill>
+          <a:prstDash val="solid"/>
+          <a:miter lim="800000"/>
+        </a:ln>
+        <a:ln w="19050" cap="flat" cmpd="sng" algn="ctr">
+          <a:solidFill>
+            <a:schemeClr val="phClr"/>
+          </a:solidFill>
+          <a:prstDash val="solid"/>
+          <a:miter lim="800000"/>
+        </a:ln>
+      </a:lnStyleLst>
+      <a:effectStyleLst>
+        <a:effectStyle>
+          <a:effectLst/>
+        </a:effectStyle>
+        <a:effectStyle>
+          <a:effectLst/>
+        </a:effectStyle>
+        <a:effectStyle>
+          <a:effectLst>
+            <a:outerShdw blurRad="57150" dist="19050" dir="5400000" algn="ctr" rotWithShape="0">
+              <a:srgbClr val="000000">
+                <a:alpha val="63000"/>
+              </a:srgbClr>
+            </a:outerShdw>
+          </a:effectLst>
+        </a:effectStyle>
+      </a:effectStyleLst>
+      <a:bgFillStyleLst>
+        <a:solidFill>
+          <a:schemeClr val="phClr"/>
+        </a:solidFill>
+        <a:solidFill>
+          <a:schemeClr val="phClr">
+            <a:tint val="95000"/>
+            <a:satMod val="170000"/>
+          </a:schemeClr>
+        </a:solidFill>
+        <a:gradFill rotWithShape="1">
+          <a:gsLst>
+            <a:gs pos="0">
+              <a:schemeClr val="phClr">
+                <a:tint val="93000"/>
+                <a:satMod val="150000"/>
+                <a:shade val="98000"/>
+                <a:lumMod val="102000"/>
+              </a:schemeClr>
+            </a:gs>
+            <a:gs pos="50000">
+              <a:schemeClr val="phClr">
+                <a:tint val="98000"/>
+                <a:satMod val="130000"/>
+                <a:shade val="90000"/>
+                <a:lumMod val="103000"/>
+              </a:schemeClr>
+            </a:gs>
+            <a:gs pos="100000">
+              <a:schemeClr val="phClr">
+                <a:shade val="63000"/>
+                <a:satMod val="120000"/>
+              </a:schemeClr>
+            </a:gs>
+          </a:gsLst>
+          <a:lin ang="5400000" scaled="0"/>
+        </a:gradFill>
+      </a:bgFillStyleLst>
+    </a:fmtScheme>
+  </a:themeElements>
+  <a:objectDefaults/>
+  <a:extraClrSchemeLst/>
+  <a:extLst>
+    <a:ext uri="{05A4C25C-085E-4340-85A3-A5531E510DB2}">
+      <thm15:themeFamily xmlns:thm15="http://schemas.microsoft.com/office/thememl/2012/main" name="Office Theme" id="{62F939B6-93AF-4DB8-9C6B-D6C7DFDC589F}" vid="{4A3C46E8-61CC-4603-A589-7422A47A8E4A}"/>
     </a:ext>
   </a:extLst>
 </a:theme>

</xml_diff>